<commit_message>
runlevel + gestion des processus
</commit_message>
<xml_diff>
--- a/CoursAdministrationLinux.pptx
+++ b/CoursAdministrationLinux.pptx
@@ -6388,9 +6388,22 @@
               <a:t>Gérer les </a:t>
             </a:r>
             <a:r>
-              <a:rPr lang="fr-FR" sz="1600" dirty="0"/>
-              <a:t>processus</a:t>
-            </a:r>
+              <a:rPr lang="fr-FR" sz="1600" smtClean="0"/>
+              <a:t>processus (+ run</a:t>
+            </a:r>
+            <a:r>
+              <a:rPr lang="fr-FR" sz="1600" dirty="0" smtClean="0"/>
+              <a:t> </a:t>
+            </a:r>
+            <a:r>
+              <a:rPr lang="fr-FR" sz="1600" dirty="0" err="1" smtClean="0"/>
+              <a:t>level</a:t>
+            </a:r>
+            <a:r>
+              <a:rPr lang="fr-FR" sz="1600" dirty="0" smtClean="0"/>
+              <a:t>)</a:t>
+            </a:r>
+            <a:endParaRPr lang="fr-FR" sz="1600" dirty="0"/>
           </a:p>
           <a:p>
             <a:endParaRPr lang="fr-FR" sz="1600" dirty="0"/>

</xml_diff>